<commit_message>
pseudocode and framwork (devide_and_conqure algorithm is going to be used for delaunay triangulation)
</commit_message>
<xml_diff>
--- a/note/01 geometry algorithm/CGAL.pptx
+++ b/note/01 geometry algorithm/CGAL.pptx
@@ -5,7 +5,7 @@
     <p:sldMasterId id="2147483648" r:id="rId1"/>
   </p:sldMasterIdLst>
   <p:notesMasterIdLst>
-    <p:notesMasterId r:id="rId12"/>
+    <p:notesMasterId r:id="rId14"/>
   </p:notesMasterIdLst>
   <p:sldIdLst>
     <p:sldId id="256" r:id="rId2"/>
@@ -18,6 +18,8 @@
     <p:sldId id="263" r:id="rId9"/>
     <p:sldId id="264" r:id="rId10"/>
     <p:sldId id="266" r:id="rId11"/>
+    <p:sldId id="269" r:id="rId12"/>
+    <p:sldId id="270" r:id="rId13"/>
   </p:sldIdLst>
   <p:sldSz cx="12192000" cy="6858000"/>
   <p:notesSz cx="6858000" cy="9144000"/>
@@ -116,6 +118,11 @@
       </a:defRPr>
     </a:lvl9pPr>
   </p:defaultTextStyle>
+  <p:extLst>
+    <p:ext uri="{EFAFB233-063F-42B5-8137-9DF3F51BA10A}">
+      <p15:sldGuideLst xmlns:p15="http://schemas.microsoft.com/office/powerpoint/2012/main"/>
+    </p:ext>
+  </p:extLst>
 </p:presentation>
 </file>
 
@@ -201,7 +208,7 @@
           <a:p>
             <a:fld id="{025D78F8-08C0-46C7-9276-31DD1FA4EAFF}" type="datetimeFigureOut">
               <a:rPr lang="zh-CN" altLang="en-US" smtClean="0"/>
-              <a:t>2023/1/12</a:t>
+              <a:t>2023/1/13</a:t>
             </a:fld>
             <a:endParaRPr lang="zh-CN" altLang="en-US"/>
           </a:p>
@@ -699,7 +706,7 @@
           <a:p>
             <a:fld id="{0B1BC029-164B-4609-8C56-EE128BF813EB}" type="datetimeFigureOut">
               <a:rPr lang="zh-CN" altLang="en-US" smtClean="0"/>
-              <a:t>2023/1/12</a:t>
+              <a:t>2023/1/13</a:t>
             </a:fld>
             <a:endParaRPr lang="zh-CN" altLang="en-US"/>
           </a:p>
@@ -897,7 +904,7 @@
           <a:p>
             <a:fld id="{0B1BC029-164B-4609-8C56-EE128BF813EB}" type="datetimeFigureOut">
               <a:rPr lang="zh-CN" altLang="en-US" smtClean="0"/>
-              <a:t>2023/1/12</a:t>
+              <a:t>2023/1/13</a:t>
             </a:fld>
             <a:endParaRPr lang="zh-CN" altLang="en-US"/>
           </a:p>
@@ -1105,7 +1112,7 @@
           <a:p>
             <a:fld id="{0B1BC029-164B-4609-8C56-EE128BF813EB}" type="datetimeFigureOut">
               <a:rPr lang="zh-CN" altLang="en-US" smtClean="0"/>
-              <a:t>2023/1/12</a:t>
+              <a:t>2023/1/13</a:t>
             </a:fld>
             <a:endParaRPr lang="zh-CN" altLang="en-US"/>
           </a:p>
@@ -1303,7 +1310,7 @@
           <a:p>
             <a:fld id="{0B1BC029-164B-4609-8C56-EE128BF813EB}" type="datetimeFigureOut">
               <a:rPr lang="zh-CN" altLang="en-US" smtClean="0"/>
-              <a:t>2023/1/12</a:t>
+              <a:t>2023/1/13</a:t>
             </a:fld>
             <a:endParaRPr lang="zh-CN" altLang="en-US"/>
           </a:p>
@@ -1578,7 +1585,7 @@
           <a:p>
             <a:fld id="{0B1BC029-164B-4609-8C56-EE128BF813EB}" type="datetimeFigureOut">
               <a:rPr lang="zh-CN" altLang="en-US" smtClean="0"/>
-              <a:t>2023/1/12</a:t>
+              <a:t>2023/1/13</a:t>
             </a:fld>
             <a:endParaRPr lang="zh-CN" altLang="en-US"/>
           </a:p>
@@ -1843,7 +1850,7 @@
           <a:p>
             <a:fld id="{0B1BC029-164B-4609-8C56-EE128BF813EB}" type="datetimeFigureOut">
               <a:rPr lang="zh-CN" altLang="en-US" smtClean="0"/>
-              <a:t>2023/1/12</a:t>
+              <a:t>2023/1/13</a:t>
             </a:fld>
             <a:endParaRPr lang="zh-CN" altLang="en-US"/>
           </a:p>
@@ -2255,7 +2262,7 @@
           <a:p>
             <a:fld id="{0B1BC029-164B-4609-8C56-EE128BF813EB}" type="datetimeFigureOut">
               <a:rPr lang="zh-CN" altLang="en-US" smtClean="0"/>
-              <a:t>2023/1/12</a:t>
+              <a:t>2023/1/13</a:t>
             </a:fld>
             <a:endParaRPr lang="zh-CN" altLang="en-US"/>
           </a:p>
@@ -2396,7 +2403,7 @@
           <a:p>
             <a:fld id="{0B1BC029-164B-4609-8C56-EE128BF813EB}" type="datetimeFigureOut">
               <a:rPr lang="zh-CN" altLang="en-US" smtClean="0"/>
-              <a:t>2023/1/12</a:t>
+              <a:t>2023/1/13</a:t>
             </a:fld>
             <a:endParaRPr lang="zh-CN" altLang="en-US"/>
           </a:p>
@@ -2509,7 +2516,7 @@
           <a:p>
             <a:fld id="{0B1BC029-164B-4609-8C56-EE128BF813EB}" type="datetimeFigureOut">
               <a:rPr lang="zh-CN" altLang="en-US" smtClean="0"/>
-              <a:t>2023/1/12</a:t>
+              <a:t>2023/1/13</a:t>
             </a:fld>
             <a:endParaRPr lang="zh-CN" altLang="en-US"/>
           </a:p>
@@ -2820,7 +2827,7 @@
           <a:p>
             <a:fld id="{0B1BC029-164B-4609-8C56-EE128BF813EB}" type="datetimeFigureOut">
               <a:rPr lang="zh-CN" altLang="en-US" smtClean="0"/>
-              <a:t>2023/1/12</a:t>
+              <a:t>2023/1/13</a:t>
             </a:fld>
             <a:endParaRPr lang="zh-CN" altLang="en-US"/>
           </a:p>
@@ -3108,7 +3115,7 @@
           <a:p>
             <a:fld id="{0B1BC029-164B-4609-8C56-EE128BF813EB}" type="datetimeFigureOut">
               <a:rPr lang="zh-CN" altLang="en-US" smtClean="0"/>
-              <a:t>2023/1/12</a:t>
+              <a:t>2023/1/13</a:t>
             </a:fld>
             <a:endParaRPr lang="zh-CN" altLang="en-US"/>
           </a:p>
@@ -3349,7 +3356,7 @@
           <a:p>
             <a:fld id="{0B1BC029-164B-4609-8C56-EE128BF813EB}" type="datetimeFigureOut">
               <a:rPr lang="zh-CN" altLang="en-US" smtClean="0"/>
-              <a:t>2023/1/12</a:t>
+              <a:t>2023/1/13</a:t>
             </a:fld>
             <a:endParaRPr lang="zh-CN" altLang="en-US"/>
           </a:p>
@@ -4380,6 +4387,575 @@
     <p:extLst>
       <p:ext uri="{BB962C8B-B14F-4D97-AF65-F5344CB8AC3E}">
         <p14:creationId xmlns:p14="http://schemas.microsoft.com/office/powerpoint/2010/main" val="2533201750"/>
+      </p:ext>
+    </p:extLst>
+  </p:cSld>
+  <p:clrMapOvr>
+    <a:masterClrMapping/>
+  </p:clrMapOvr>
+</p:sld>
+</file>
+
+<file path=ppt/slides/slide11.xml><?xml version="1.0" encoding="utf-8"?>
+<p:sld xmlns:a="http://schemas.openxmlformats.org/drawingml/2006/main" xmlns:r="http://schemas.openxmlformats.org/officeDocument/2006/relationships" xmlns:p="http://schemas.openxmlformats.org/presentationml/2006/main">
+  <p:cSld>
+    <p:spTree>
+      <p:nvGrpSpPr>
+        <p:cNvPr id="1" name=""/>
+        <p:cNvGrpSpPr/>
+        <p:nvPr/>
+      </p:nvGrpSpPr>
+      <p:grpSpPr>
+        <a:xfrm>
+          <a:off x="0" y="0"/>
+          <a:ext cx="0" cy="0"/>
+          <a:chOff x="0" y="0"/>
+          <a:chExt cx="0" cy="0"/>
+        </a:xfrm>
+      </p:grpSpPr>
+      <p:sp>
+        <p:nvSpPr>
+          <p:cNvPr id="9" name="标题 1">
+            <a:extLst>
+              <a:ext uri="{FF2B5EF4-FFF2-40B4-BE49-F238E27FC236}">
+                <a16:creationId xmlns:a16="http://schemas.microsoft.com/office/drawing/2014/main" id="{BFD7FB49-DD9E-AE29-3481-4461AB08FD6F}"/>
+              </a:ext>
+            </a:extLst>
+          </p:cNvPr>
+          <p:cNvSpPr>
+            <a:spLocks noGrp="1"/>
+          </p:cNvSpPr>
+          <p:nvPr>
+            <p:ph type="title"/>
+          </p:nvPr>
+        </p:nvSpPr>
+        <p:spPr>
+          <a:xfrm>
+            <a:off x="838200" y="365125"/>
+            <a:ext cx="10515600" cy="727075"/>
+          </a:xfrm>
+        </p:spPr>
+        <p:txBody>
+          <a:bodyPr>
+            <a:normAutofit/>
+          </a:bodyPr>
+          <a:lstStyle/>
+          <a:p>
+            <a:r>
+              <a:rPr lang="zh-CN" altLang="en-US" sz="2500" b="1" dirty="0">
+                <a:latin typeface="微软雅黑" panose="020B0503020204020204" pitchFamily="34" charset="-122"/>
+                <a:ea typeface="微软雅黑" panose="020B0503020204020204" pitchFamily="34" charset="-122"/>
+              </a:rPr>
+              <a:t>继续深入深入代码</a:t>
+            </a:r>
+          </a:p>
+        </p:txBody>
+      </p:sp>
+      <p:pic>
+        <p:nvPicPr>
+          <p:cNvPr id="19" name="图片 18">
+            <a:extLst>
+              <a:ext uri="{FF2B5EF4-FFF2-40B4-BE49-F238E27FC236}">
+                <a16:creationId xmlns:a16="http://schemas.microsoft.com/office/drawing/2014/main" id="{36809E50-93DD-85C5-972B-C995853E2D0E}"/>
+              </a:ext>
+            </a:extLst>
+          </p:cNvPr>
+          <p:cNvPicPr>
+            <a:picLocks noChangeAspect="1"/>
+          </p:cNvPicPr>
+          <p:nvPr/>
+        </p:nvPicPr>
+        <p:blipFill>
+          <a:blip r:embed="rId2"/>
+          <a:stretch>
+            <a:fillRect/>
+          </a:stretch>
+        </p:blipFill>
+        <p:spPr>
+          <a:xfrm>
+            <a:off x="6363135" y="677143"/>
+            <a:ext cx="5656742" cy="2876951"/>
+          </a:xfrm>
+          <a:prstGeom prst="rect">
+            <a:avLst/>
+          </a:prstGeom>
+        </p:spPr>
+      </p:pic>
+      <p:sp>
+        <p:nvSpPr>
+          <p:cNvPr id="20" name="文本框 19">
+            <a:extLst>
+              <a:ext uri="{FF2B5EF4-FFF2-40B4-BE49-F238E27FC236}">
+                <a16:creationId xmlns:a16="http://schemas.microsoft.com/office/drawing/2014/main" id="{A857B810-761F-DA9D-6066-C5BAE8435611}"/>
+              </a:ext>
+            </a:extLst>
+          </p:cNvPr>
+          <p:cNvSpPr txBox="1"/>
+          <p:nvPr/>
+        </p:nvSpPr>
+        <p:spPr>
+          <a:xfrm>
+            <a:off x="838200" y="1409662"/>
+            <a:ext cx="3536089" cy="830997"/>
+          </a:xfrm>
+          <a:prstGeom prst="rect">
+            <a:avLst/>
+          </a:prstGeom>
+          <a:noFill/>
+        </p:spPr>
+        <p:txBody>
+          <a:bodyPr wrap="square" rtlCol="0">
+            <a:spAutoFit/>
+          </a:bodyPr>
+          <a:lstStyle/>
+          <a:p>
+            <a:r>
+              <a:rPr lang="zh-CN" altLang="en-US" sz="1600" b="1" dirty="0">
+                <a:solidFill>
+                  <a:srgbClr val="FF0000"/>
+                </a:solidFill>
+              </a:rPr>
+              <a:t>问题一：为什么算法类里面有了</a:t>
+            </a:r>
+            <a:r>
+              <a:rPr lang="en-US" altLang="zh-CN" sz="1600" b="1" dirty="0">
+                <a:solidFill>
+                  <a:srgbClr val="FF0000"/>
+                </a:solidFill>
+              </a:rPr>
+              <a:t>iterator</a:t>
+            </a:r>
+            <a:r>
+              <a:rPr lang="zh-CN" altLang="en-US" sz="1600" b="1" dirty="0">
+                <a:solidFill>
+                  <a:srgbClr val="FF0000"/>
+                </a:solidFill>
+              </a:rPr>
+              <a:t>之后，还要有</a:t>
+            </a:r>
+            <a:r>
+              <a:rPr lang="en-US" altLang="zh-CN" sz="1600" b="1" dirty="0">
+                <a:solidFill>
+                  <a:srgbClr val="FF0000"/>
+                </a:solidFill>
+              </a:rPr>
+              <a:t>handle</a:t>
+            </a:r>
+            <a:r>
+              <a:rPr lang="zh-CN" altLang="en-US" sz="1600" b="1" dirty="0">
+                <a:solidFill>
+                  <a:srgbClr val="FF0000"/>
+                </a:solidFill>
+              </a:rPr>
+              <a:t>，他们作用有什么区分</a:t>
+            </a:r>
+            <a:endParaRPr lang="en-US" altLang="zh-CN" sz="1600" b="1" dirty="0">
+              <a:solidFill>
+                <a:srgbClr val="FF0000"/>
+              </a:solidFill>
+            </a:endParaRPr>
+          </a:p>
+        </p:txBody>
+      </p:sp>
+      <p:pic>
+        <p:nvPicPr>
+          <p:cNvPr id="22" name="图片 21">
+            <a:extLst>
+              <a:ext uri="{FF2B5EF4-FFF2-40B4-BE49-F238E27FC236}">
+                <a16:creationId xmlns:a16="http://schemas.microsoft.com/office/drawing/2014/main" id="{2DE0DD81-92FE-B3FD-208E-68F51AD413AF}"/>
+              </a:ext>
+            </a:extLst>
+          </p:cNvPr>
+          <p:cNvPicPr>
+            <a:picLocks noChangeAspect="1"/>
+          </p:cNvPicPr>
+          <p:nvPr/>
+        </p:nvPicPr>
+        <p:blipFill>
+          <a:blip r:embed="rId3"/>
+          <a:stretch>
+            <a:fillRect/>
+          </a:stretch>
+        </p:blipFill>
+        <p:spPr>
+          <a:xfrm>
+            <a:off x="6363135" y="3954217"/>
+            <a:ext cx="5656742" cy="2712304"/>
+          </a:xfrm>
+          <a:prstGeom prst="rect">
+            <a:avLst/>
+          </a:prstGeom>
+        </p:spPr>
+      </p:pic>
+      <p:sp>
+        <p:nvSpPr>
+          <p:cNvPr id="23" name="文本框 22">
+            <a:extLst>
+              <a:ext uri="{FF2B5EF4-FFF2-40B4-BE49-F238E27FC236}">
+                <a16:creationId xmlns:a16="http://schemas.microsoft.com/office/drawing/2014/main" id="{0FBC3941-8BB2-ADB0-AA6D-7A367D1496B5}"/>
+              </a:ext>
+            </a:extLst>
+          </p:cNvPr>
+          <p:cNvSpPr txBox="1"/>
+          <p:nvPr/>
+        </p:nvSpPr>
+        <p:spPr>
+          <a:xfrm>
+            <a:off x="2248349" y="4532367"/>
+            <a:ext cx="3847652" cy="830997"/>
+          </a:xfrm>
+          <a:prstGeom prst="rect">
+            <a:avLst/>
+          </a:prstGeom>
+          <a:noFill/>
+        </p:spPr>
+        <p:txBody>
+          <a:bodyPr wrap="square" rtlCol="0">
+            <a:spAutoFit/>
+          </a:bodyPr>
+          <a:lstStyle/>
+          <a:p>
+            <a:r>
+              <a:rPr lang="zh-CN" altLang="en-US" sz="1600" b="1" dirty="0"/>
+              <a:t>大部分的算法好像都是直接操作</a:t>
+            </a:r>
+            <a:r>
+              <a:rPr lang="en-US" altLang="zh-CN" sz="1600" b="1" dirty="0"/>
+              <a:t>handle</a:t>
+            </a:r>
+            <a:r>
+              <a:rPr lang="zh-CN" altLang="en-US" sz="1600" b="1" dirty="0"/>
+              <a:t>；如果迭代器是直接操作底层连续数组，那</a:t>
+            </a:r>
+            <a:r>
+              <a:rPr lang="en-US" altLang="zh-CN" sz="1600" b="1" dirty="0"/>
+              <a:t>handle</a:t>
+            </a:r>
+            <a:r>
+              <a:rPr lang="zh-CN" altLang="en-US" sz="1600" b="1" dirty="0"/>
+              <a:t>物理表示又是什么呢？</a:t>
+            </a:r>
+            <a:endParaRPr lang="en-US" altLang="zh-CN" sz="1600" b="1" dirty="0"/>
+          </a:p>
+        </p:txBody>
+      </p:sp>
+      <p:sp>
+        <p:nvSpPr>
+          <p:cNvPr id="24" name="文本框 23">
+            <a:extLst>
+              <a:ext uri="{FF2B5EF4-FFF2-40B4-BE49-F238E27FC236}">
+                <a16:creationId xmlns:a16="http://schemas.microsoft.com/office/drawing/2014/main" id="{2664D2A1-5551-D6C7-DAA3-C8C010E667D1}"/>
+              </a:ext>
+            </a:extLst>
+          </p:cNvPr>
+          <p:cNvSpPr txBox="1"/>
+          <p:nvPr/>
+        </p:nvSpPr>
+        <p:spPr>
+          <a:xfrm>
+            <a:off x="387276" y="3059668"/>
+            <a:ext cx="2723823" cy="369332"/>
+          </a:xfrm>
+          <a:prstGeom prst="rect">
+            <a:avLst/>
+          </a:prstGeom>
+          <a:noFill/>
+        </p:spPr>
+        <p:txBody>
+          <a:bodyPr wrap="none" rtlCol="0">
+            <a:spAutoFit/>
+          </a:bodyPr>
+          <a:lstStyle/>
+          <a:p>
+            <a:r>
+              <a:rPr lang="zh-CN" altLang="en-US" b="1" dirty="0">
+                <a:solidFill>
+                  <a:srgbClr val="C00000"/>
+                </a:solidFill>
+              </a:rPr>
+              <a:t>一头雾水啊。。。。。。</a:t>
+            </a:r>
+          </a:p>
+        </p:txBody>
+      </p:sp>
+    </p:spTree>
+    <p:extLst>
+      <p:ext uri="{BB962C8B-B14F-4D97-AF65-F5344CB8AC3E}">
+        <p14:creationId xmlns:p14="http://schemas.microsoft.com/office/powerpoint/2010/main" val="13855545"/>
+      </p:ext>
+    </p:extLst>
+  </p:cSld>
+  <p:clrMapOvr>
+    <a:masterClrMapping/>
+  </p:clrMapOvr>
+</p:sld>
+</file>
+
+<file path=ppt/slides/slide12.xml><?xml version="1.0" encoding="utf-8"?>
+<p:sld xmlns:a="http://schemas.openxmlformats.org/drawingml/2006/main" xmlns:r="http://schemas.openxmlformats.org/officeDocument/2006/relationships" xmlns:p="http://schemas.openxmlformats.org/presentationml/2006/main">
+  <p:cSld>
+    <p:spTree>
+      <p:nvGrpSpPr>
+        <p:cNvPr id="1" name=""/>
+        <p:cNvGrpSpPr/>
+        <p:nvPr/>
+      </p:nvGrpSpPr>
+      <p:grpSpPr>
+        <a:xfrm>
+          <a:off x="0" y="0"/>
+          <a:ext cx="0" cy="0"/>
+          <a:chOff x="0" y="0"/>
+          <a:chExt cx="0" cy="0"/>
+        </a:xfrm>
+      </p:grpSpPr>
+      <p:sp>
+        <p:nvSpPr>
+          <p:cNvPr id="9" name="标题 1">
+            <a:extLst>
+              <a:ext uri="{FF2B5EF4-FFF2-40B4-BE49-F238E27FC236}">
+                <a16:creationId xmlns:a16="http://schemas.microsoft.com/office/drawing/2014/main" id="{BFD7FB49-DD9E-AE29-3481-4461AB08FD6F}"/>
+              </a:ext>
+            </a:extLst>
+          </p:cNvPr>
+          <p:cNvSpPr>
+            <a:spLocks noGrp="1"/>
+          </p:cNvSpPr>
+          <p:nvPr>
+            <p:ph type="title"/>
+          </p:nvPr>
+        </p:nvSpPr>
+        <p:spPr>
+          <a:xfrm>
+            <a:off x="838200" y="365125"/>
+            <a:ext cx="10515600" cy="727075"/>
+          </a:xfrm>
+        </p:spPr>
+        <p:txBody>
+          <a:bodyPr>
+            <a:normAutofit/>
+          </a:bodyPr>
+          <a:lstStyle/>
+          <a:p>
+            <a:r>
+              <a:rPr lang="zh-CN" altLang="en-US" sz="2500" b="1" dirty="0">
+                <a:latin typeface="微软雅黑" panose="020B0503020204020204" pitchFamily="34" charset="-122"/>
+                <a:ea typeface="微软雅黑" panose="020B0503020204020204" pitchFamily="34" charset="-122"/>
+              </a:rPr>
+              <a:t>继续深入深入代码</a:t>
+            </a:r>
+          </a:p>
+        </p:txBody>
+      </p:sp>
+      <p:pic>
+        <p:nvPicPr>
+          <p:cNvPr id="3" name="图片 2">
+            <a:extLst>
+              <a:ext uri="{FF2B5EF4-FFF2-40B4-BE49-F238E27FC236}">
+                <a16:creationId xmlns:a16="http://schemas.microsoft.com/office/drawing/2014/main" id="{EC5C435B-0E7B-FEF4-A6C5-315BC1681301}"/>
+              </a:ext>
+            </a:extLst>
+          </p:cNvPr>
+          <p:cNvPicPr>
+            <a:picLocks noChangeAspect="1"/>
+          </p:cNvPicPr>
+          <p:nvPr/>
+        </p:nvPicPr>
+        <p:blipFill>
+          <a:blip r:embed="rId2"/>
+          <a:stretch>
+            <a:fillRect/>
+          </a:stretch>
+        </p:blipFill>
+        <p:spPr>
+          <a:xfrm>
+            <a:off x="339272" y="1673337"/>
+            <a:ext cx="6220693" cy="4544059"/>
+          </a:xfrm>
+          <a:prstGeom prst="rect">
+            <a:avLst/>
+          </a:prstGeom>
+        </p:spPr>
+      </p:pic>
+      <p:sp>
+        <p:nvSpPr>
+          <p:cNvPr id="4" name="文本框 3">
+            <a:extLst>
+              <a:ext uri="{FF2B5EF4-FFF2-40B4-BE49-F238E27FC236}">
+                <a16:creationId xmlns:a16="http://schemas.microsoft.com/office/drawing/2014/main" id="{0CCCFE2C-9A0F-2636-567D-1203E5D84946}"/>
+              </a:ext>
+            </a:extLst>
+          </p:cNvPr>
+          <p:cNvSpPr txBox="1"/>
+          <p:nvPr/>
+        </p:nvSpPr>
+        <p:spPr>
+          <a:xfrm>
+            <a:off x="339272" y="1137559"/>
+            <a:ext cx="3315331" cy="369332"/>
+          </a:xfrm>
+          <a:prstGeom prst="rect">
+            <a:avLst/>
+          </a:prstGeom>
+          <a:noFill/>
+        </p:spPr>
+        <p:txBody>
+          <a:bodyPr wrap="none" rtlCol="0">
+            <a:spAutoFit/>
+          </a:bodyPr>
+          <a:lstStyle/>
+          <a:p>
+            <a:r>
+              <a:rPr lang="en-US" altLang="zh-CN" dirty="0"/>
+              <a:t>Handle</a:t>
+            </a:r>
+            <a:r>
+              <a:rPr lang="zh-CN" altLang="en-US" dirty="0"/>
+              <a:t>是定义在</a:t>
+            </a:r>
+            <a:r>
+              <a:rPr lang="en-US" altLang="zh-CN" dirty="0" err="1"/>
+              <a:t>Tds</a:t>
+            </a:r>
+            <a:r>
+              <a:rPr lang="zh-CN" altLang="en-US" dirty="0"/>
+              <a:t>数据结构中</a:t>
+            </a:r>
+          </a:p>
+        </p:txBody>
+      </p:sp>
+      <p:sp>
+        <p:nvSpPr>
+          <p:cNvPr id="5" name="文本框 4">
+            <a:extLst>
+              <a:ext uri="{FF2B5EF4-FFF2-40B4-BE49-F238E27FC236}">
+                <a16:creationId xmlns:a16="http://schemas.microsoft.com/office/drawing/2014/main" id="{253113ED-6D21-C86F-391E-4B176B5E11EF}"/>
+              </a:ext>
+            </a:extLst>
+          </p:cNvPr>
+          <p:cNvSpPr txBox="1"/>
+          <p:nvPr/>
+        </p:nvSpPr>
+        <p:spPr>
+          <a:xfrm>
+            <a:off x="6745045" y="2796988"/>
+            <a:ext cx="3914854" cy="369332"/>
+          </a:xfrm>
+          <a:prstGeom prst="rect">
+            <a:avLst/>
+          </a:prstGeom>
+          <a:noFill/>
+        </p:spPr>
+        <p:txBody>
+          <a:bodyPr wrap="none" rtlCol="0">
+            <a:spAutoFit/>
+          </a:bodyPr>
+          <a:lstStyle/>
+          <a:p>
+            <a:r>
+              <a:rPr lang="en-US" altLang="zh-CN" dirty="0"/>
+              <a:t>Iterator</a:t>
+            </a:r>
+            <a:r>
+              <a:rPr lang="zh-CN" altLang="en-US" dirty="0"/>
+              <a:t>和</a:t>
+            </a:r>
+            <a:r>
+              <a:rPr lang="en-US" altLang="zh-CN" dirty="0"/>
+              <a:t>handle</a:t>
+            </a:r>
+            <a:r>
+              <a:rPr lang="zh-CN" altLang="en-US" dirty="0"/>
+              <a:t>的源头好像是一样的</a:t>
+            </a:r>
+          </a:p>
+        </p:txBody>
+      </p:sp>
+      <p:sp>
+        <p:nvSpPr>
+          <p:cNvPr id="6" name="文本框 5">
+            <a:extLst>
+              <a:ext uri="{FF2B5EF4-FFF2-40B4-BE49-F238E27FC236}">
+                <a16:creationId xmlns:a16="http://schemas.microsoft.com/office/drawing/2014/main" id="{9E45148C-F217-12CA-A3E7-B168470859FE}"/>
+              </a:ext>
+            </a:extLst>
+          </p:cNvPr>
+          <p:cNvSpPr txBox="1"/>
+          <p:nvPr/>
+        </p:nvSpPr>
+        <p:spPr>
+          <a:xfrm>
+            <a:off x="6745045" y="3945366"/>
+            <a:ext cx="4281543" cy="646331"/>
+          </a:xfrm>
+          <a:prstGeom prst="rect">
+            <a:avLst/>
+          </a:prstGeom>
+          <a:noFill/>
+        </p:spPr>
+        <p:txBody>
+          <a:bodyPr wrap="square" rtlCol="0">
+            <a:spAutoFit/>
+          </a:bodyPr>
+          <a:lstStyle/>
+          <a:p>
+            <a:r>
+              <a:rPr lang="zh-CN" altLang="en-US" b="1" dirty="0">
+                <a:solidFill>
+                  <a:srgbClr val="C00000"/>
+                </a:solidFill>
+              </a:rPr>
+              <a:t>猜测：一个是对内的，一个是对外的，所以做的区分？？？？</a:t>
+            </a:r>
+          </a:p>
+        </p:txBody>
+      </p:sp>
+      <p:sp>
+        <p:nvSpPr>
+          <p:cNvPr id="7" name="文本框 6">
+            <a:extLst>
+              <a:ext uri="{FF2B5EF4-FFF2-40B4-BE49-F238E27FC236}">
+                <a16:creationId xmlns:a16="http://schemas.microsoft.com/office/drawing/2014/main" id="{5FE599C2-43EC-D2A4-AAE9-D5D79CE15082}"/>
+              </a:ext>
+            </a:extLst>
+          </p:cNvPr>
+          <p:cNvSpPr txBox="1"/>
+          <p:nvPr/>
+        </p:nvSpPr>
+        <p:spPr>
+          <a:xfrm>
+            <a:off x="7086601" y="5290074"/>
+            <a:ext cx="3219225" cy="369332"/>
+          </a:xfrm>
+          <a:prstGeom prst="rect">
+            <a:avLst/>
+          </a:prstGeom>
+          <a:noFill/>
+        </p:spPr>
+        <p:txBody>
+          <a:bodyPr wrap="square" rtlCol="0">
+            <a:spAutoFit/>
+          </a:bodyPr>
+          <a:lstStyle/>
+          <a:p>
+            <a:r>
+              <a:rPr lang="zh-CN" altLang="en-US" dirty="0"/>
+              <a:t>先看看</a:t>
+            </a:r>
+            <a:r>
+              <a:rPr lang="en-US" altLang="zh-CN" dirty="0" err="1"/>
+              <a:t>compact_container</a:t>
+            </a:r>
+            <a:r>
+              <a:rPr lang="zh-CN" altLang="en-US" dirty="0"/>
+              <a:t>吧</a:t>
+            </a:r>
+          </a:p>
+        </p:txBody>
+      </p:sp>
+    </p:spTree>
+    <p:extLst>
+      <p:ext uri="{BB962C8B-B14F-4D97-AF65-F5344CB8AC3E}">
+        <p14:creationId xmlns:p14="http://schemas.microsoft.com/office/powerpoint/2010/main" val="2887385636"/>
       </p:ext>
     </p:extLst>
   </p:cSld>

</xml_diff>